<commit_message>
Ajout conclusion power point
</commit_message>
<xml_diff>
--- a/Projet 3.pptx
+++ b/Projet 3.pptx
@@ -4626,7 +4626,9 @@
         </p:nvSpPr>
         <p:spPr/>
         <p:txBody>
-          <a:bodyPr/>
+          <a:bodyPr>
+            <a:normAutofit/>
+          </a:bodyPr>
           <a:lstStyle/>
           <a:p>
             <a:endParaRPr lang="fr-FR" dirty="0" smtClean="0"/>
@@ -4641,7 +4643,19 @@
             </a:r>
           </a:p>
           <a:p>
-            <a:endParaRPr lang="fr-FR" dirty="0"/>
+            <a:pPr lvl="1"/>
+            <a:r>
+              <a:rPr lang="fr-FR" sz="1800" dirty="0" smtClean="0"/>
+              <a:t>Elaboration de la gestion collision</a:t>
+            </a:r>
+          </a:p>
+          <a:p>
+            <a:pPr lvl="1"/>
+            <a:r>
+              <a:rPr lang="fr-FR" sz="1800" dirty="0" smtClean="0"/>
+              <a:t>Apprentissage du langage orienté objet</a:t>
+            </a:r>
+            <a:endParaRPr lang="fr-FR" sz="1800" dirty="0"/>
           </a:p>
           <a:p>
             <a:endParaRPr lang="fr-FR" dirty="0" smtClean="0"/>
@@ -4653,7 +4667,23 @@
             </a:r>
           </a:p>
           <a:p>
-            <a:endParaRPr lang="fr-FR" dirty="0"/>
+            <a:pPr lvl="1"/>
+            <a:r>
+              <a:rPr lang="fr-FR" sz="1600" dirty="0" smtClean="0"/>
+              <a:t>Plus d’interaction avec le gardien</a:t>
+            </a:r>
+          </a:p>
+          <a:p>
+            <a:pPr lvl="1"/>
+            <a:r>
+              <a:rPr lang="fr-FR" sz="1600" dirty="0" smtClean="0"/>
+              <a:t>Mise en place de monstre et d arme pour Mac </a:t>
+            </a:r>
+            <a:r>
+              <a:rPr lang="fr-FR" sz="1600" dirty="0" err="1" smtClean="0"/>
+              <a:t>Gayver</a:t>
+            </a:r>
+            <a:endParaRPr lang="fr-FR" sz="1600" dirty="0"/>
           </a:p>
         </p:txBody>
       </p:sp>
@@ -6649,11 +6679,7 @@
           <a:p>
             <a:r>
               <a:rPr lang="fr-FR" sz="1100" dirty="0" smtClean="0"/>
-              <a:t>Objets ramassés &gt;</a:t>
-            </a:r>
-            <a:r>
-              <a:rPr lang="fr-FR" sz="1100" dirty="0" smtClean="0"/>
-              <a:t> Objets ramassés  précédemment </a:t>
+              <a:t>Objets ramassés &gt; Objets ramassés  précédemment </a:t>
             </a:r>
           </a:p>
           <a:p>
@@ -6691,11 +6717,7 @@
           <a:p>
             <a:r>
               <a:rPr lang="fr-FR" sz="1100" dirty="0" smtClean="0"/>
-              <a:t>Objets ramassés =</a:t>
-            </a:r>
-            <a:r>
-              <a:rPr lang="fr-FR" sz="1100" dirty="0" smtClean="0"/>
-              <a:t> Objets ramassés  précédemment </a:t>
+              <a:t>Objets ramassés = Objets ramassés  précédemment </a:t>
             </a:r>
           </a:p>
           <a:p>

</xml_diff>

<commit_message>
Modification emplacement Class Objet et correction
- suppression de la méthode ListeImgDec de la class Objet
</commit_message>
<xml_diff>
--- a/Projet 3.pptx
+++ b/Projet 3.pptx
@@ -4794,7 +4794,11 @@
           <a:p>
             <a:r>
               <a:rPr lang="fr-FR" dirty="0" smtClean="0"/>
-              <a:t>Evènement gardien</a:t>
+              <a:t>Evènements </a:t>
+            </a:r>
+            <a:r>
+              <a:rPr lang="fr-FR" dirty="0" smtClean="0"/>
+              <a:t>gardien</a:t>
             </a:r>
           </a:p>
           <a:p>
@@ -4902,7 +4906,7 @@
         <p:spPr/>
         <p:txBody>
           <a:bodyPr>
-            <a:normAutofit lnSpcReduction="10000"/>
+            <a:normAutofit/>
           </a:bodyPr>
           <a:lstStyle/>
           <a:p>
@@ -4953,13 +4957,6 @@
             <a:r>
               <a:rPr lang="fr-FR" dirty="0" smtClean="0"/>
               <a:t> doit se déplacer dans un labyrinthe en ramassant des objets afin de pouvoir se présenter devant le gardien pour qu’il le laisse passer</a:t>
-            </a:r>
-          </a:p>
-          <a:p>
-            <a:pPr lvl="1"/>
-            <a:r>
-              <a:rPr lang="fr-FR" dirty="0" smtClean="0"/>
-              <a:t>Librairie utilisée</a:t>
             </a:r>
           </a:p>
           <a:p>

</xml_diff>